<commit_message>
4 more caveats OK
</commit_message>
<xml_diff>
--- a/img/mistake/mistake_logos.pptx
+++ b/img/mistake/mistake_logos.pptx
@@ -1897,10 +1897,10 @@
               <a:t>blog.minitab.com</a:t>
             </a:r>
             <a:r>
-              <a:rPr lang="en-US" smtClean="0"/>
+              <a:rPr lang="en-US" dirty="0" smtClean="0"/>
               <a:t>/blog/fun-with-statistics/beware-the-radar-chart</a:t>
             </a:r>
-            <a:endParaRPr lang="en-US"/>
+            <a:endParaRPr lang="en-US" dirty="0"/>
           </a:p>
         </p:txBody>
       </p:sp>

</xml_diff>

<commit_message>
4 new graph pages
</commit_message>
<xml_diff>
--- a/img/mistake/mistake_logos.pptx
+++ b/img/mistake/mistake_logos.pptx
@@ -230,7 +230,7 @@
           <a:p>
             <a:fld id="{A29C25AE-20FD-CA4A-8C80-D7AD6B352ECC}" type="datetimeFigureOut">
               <a:rPr lang="en-US" smtClean="0"/>
-              <a:t>6/18/18</a:t>
+              <a:t>6/19/18</a:t>
             </a:fld>
             <a:endParaRPr lang="en-US"/>
           </a:p>
@@ -1296,7 +1296,50 @@
           <a:p>
             <a:r>
               <a:rPr lang="en-US" dirty="0" smtClean="0"/>
-              <a:t>It’s hard to read bubble sizes</a:t>
+              <a:t>It’s </a:t>
+            </a:r>
+            <a:r>
+              <a:rPr lang="en-US" dirty="0" smtClean="0"/>
+              <a:t>hard </a:t>
+            </a:r>
+            <a:r>
+              <a:rPr lang="en-US" dirty="0" smtClean="0"/>
+              <a:t>to read bubble </a:t>
+            </a:r>
+            <a:r>
+              <a:rPr lang="en-US" dirty="0" smtClean="0"/>
+              <a:t>sizes</a:t>
+            </a:r>
+          </a:p>
+          <a:p>
+            <a:endParaRPr lang="en-US" dirty="0" smtClean="0"/>
+          </a:p>
+          <a:p>
+            <a:r>
+              <a:rPr lang="en-US" dirty="0" smtClean="0"/>
+              <a:t>See https://</a:t>
+            </a:r>
+            <a:r>
+              <a:rPr lang="en-US" dirty="0" err="1" smtClean="0"/>
+              <a:t>carto.com</a:t>
+            </a:r>
+            <a:r>
+              <a:rPr lang="en-US" dirty="0" smtClean="0"/>
+              <a:t>/academy/courses/intermediate-design/which-kind-of-map-should-</a:t>
+            </a:r>
+            <a:r>
+              <a:rPr lang="en-US" dirty="0" err="1" smtClean="0"/>
+              <a:t>i</a:t>
+            </a:r>
+            <a:r>
+              <a:rPr lang="en-US" smtClean="0"/>
+              <a:t>-make/ </a:t>
+            </a:r>
+            <a:r>
+              <a:rPr lang="en-US" smtClean="0">
+                <a:sym typeface="Wingdings"/>
+              </a:rPr>
+              <a:t> VERY GOOD EXAMPLES!</a:t>
             </a:r>
             <a:endParaRPr lang="en-US" dirty="0"/>
           </a:p>
@@ -3574,7 +3617,7 @@
           <a:p>
             <a:fld id="{59DFCC1F-3322-FD40-8733-43910790F7FA}" type="datetimeFigureOut">
               <a:rPr lang="en-US" smtClean="0"/>
-              <a:t>6/18/18</a:t>
+              <a:t>6/19/18</a:t>
             </a:fld>
             <a:endParaRPr lang="en-US"/>
           </a:p>
@@ -3739,7 +3782,7 @@
           <a:p>
             <a:fld id="{59DFCC1F-3322-FD40-8733-43910790F7FA}" type="datetimeFigureOut">
               <a:rPr lang="en-US" smtClean="0"/>
-              <a:t>6/18/18</a:t>
+              <a:t>6/19/18</a:t>
             </a:fld>
             <a:endParaRPr lang="en-US"/>
           </a:p>
@@ -3914,7 +3957,7 @@
           <a:p>
             <a:fld id="{59DFCC1F-3322-FD40-8733-43910790F7FA}" type="datetimeFigureOut">
               <a:rPr lang="en-US" smtClean="0"/>
-              <a:t>6/18/18</a:t>
+              <a:t>6/19/18</a:t>
             </a:fld>
             <a:endParaRPr lang="en-US"/>
           </a:p>
@@ -4079,7 +4122,7 @@
           <a:p>
             <a:fld id="{59DFCC1F-3322-FD40-8733-43910790F7FA}" type="datetimeFigureOut">
               <a:rPr lang="en-US" smtClean="0"/>
-              <a:t>6/18/18</a:t>
+              <a:t>6/19/18</a:t>
             </a:fld>
             <a:endParaRPr lang="en-US"/>
           </a:p>
@@ -4318,7 +4361,7 @@
           <a:p>
             <a:fld id="{59DFCC1F-3322-FD40-8733-43910790F7FA}" type="datetimeFigureOut">
               <a:rPr lang="en-US" smtClean="0"/>
-              <a:t>6/18/18</a:t>
+              <a:t>6/19/18</a:t>
             </a:fld>
             <a:endParaRPr lang="en-US"/>
           </a:p>
@@ -4545,7 +4588,7 @@
           <a:p>
             <a:fld id="{59DFCC1F-3322-FD40-8733-43910790F7FA}" type="datetimeFigureOut">
               <a:rPr lang="en-US" smtClean="0"/>
-              <a:t>6/18/18</a:t>
+              <a:t>6/19/18</a:t>
             </a:fld>
             <a:endParaRPr lang="en-US"/>
           </a:p>
@@ -4907,7 +4950,7 @@
           <a:p>
             <a:fld id="{59DFCC1F-3322-FD40-8733-43910790F7FA}" type="datetimeFigureOut">
               <a:rPr lang="en-US" smtClean="0"/>
-              <a:t>6/18/18</a:t>
+              <a:t>6/19/18</a:t>
             </a:fld>
             <a:endParaRPr lang="en-US"/>
           </a:p>
@@ -5020,7 +5063,7 @@
           <a:p>
             <a:fld id="{59DFCC1F-3322-FD40-8733-43910790F7FA}" type="datetimeFigureOut">
               <a:rPr lang="en-US" smtClean="0"/>
-              <a:t>6/18/18</a:t>
+              <a:t>6/19/18</a:t>
             </a:fld>
             <a:endParaRPr lang="en-US"/>
           </a:p>
@@ -5110,7 +5153,7 @@
           <a:p>
             <a:fld id="{59DFCC1F-3322-FD40-8733-43910790F7FA}" type="datetimeFigureOut">
               <a:rPr lang="en-US" smtClean="0"/>
-              <a:t>6/18/18</a:t>
+              <a:t>6/19/18</a:t>
             </a:fld>
             <a:endParaRPr lang="en-US"/>
           </a:p>
@@ -5382,7 +5425,7 @@
           <a:p>
             <a:fld id="{59DFCC1F-3322-FD40-8733-43910790F7FA}" type="datetimeFigureOut">
               <a:rPr lang="en-US" smtClean="0"/>
-              <a:t>6/18/18</a:t>
+              <a:t>6/19/18</a:t>
             </a:fld>
             <a:endParaRPr lang="en-US"/>
           </a:p>
@@ -5634,7 +5677,7 @@
           <a:p>
             <a:fld id="{59DFCC1F-3322-FD40-8733-43910790F7FA}" type="datetimeFigureOut">
               <a:rPr lang="en-US" smtClean="0"/>
-              <a:t>6/18/18</a:t>
+              <a:t>6/19/18</a:t>
             </a:fld>
             <a:endParaRPr lang="en-US"/>
           </a:p>
@@ -5842,7 +5885,7 @@
           <a:p>
             <a:fld id="{59DFCC1F-3322-FD40-8733-43910790F7FA}" type="datetimeFigureOut">
               <a:rPr lang="en-US" smtClean="0"/>
-              <a:t>6/18/18</a:t>
+              <a:t>6/19/18</a:t>
             </a:fld>
             <a:endParaRPr lang="en-US"/>
           </a:p>

</xml_diff>